<commit_message>
statistics addition in presentation
</commit_message>
<xml_diff>
--- a/MegaPolls.pptx
+++ b/MegaPolls.pptx
@@ -8,9 +8,10 @@
     <p:sldId id="256" r:id="rId2"/>
     <p:sldId id="257" r:id="rId3"/>
     <p:sldId id="258" r:id="rId4"/>
-    <p:sldId id="259" r:id="rId5"/>
-    <p:sldId id="260" r:id="rId6"/>
-    <p:sldId id="261" r:id="rId7"/>
+    <p:sldId id="262" r:id="rId5"/>
+    <p:sldId id="259" r:id="rId6"/>
+    <p:sldId id="260" r:id="rId7"/>
+    <p:sldId id="261" r:id="rId8"/>
   </p:sldIdLst>
   <p:sldSz cx="12192000" cy="6858000"/>
   <p:notesSz cx="6858000" cy="9144000"/>
@@ -109,6 +110,11 @@
       </a:defRPr>
     </a:lvl9pPr>
   </p:defaultTextStyle>
+  <p:extLst>
+    <p:ext uri="{EFAFB233-063F-42B5-8137-9DF3F51BA10A}">
+      <p15:sldGuideLst xmlns:p15="http://schemas.microsoft.com/office/powerpoint/2012/main"/>
+    </p:ext>
+  </p:extLst>
 </p:presentation>
 </file>
 
@@ -259,7 +265,7 @@
           <a:p>
             <a:fld id="{5D8E3154-8C91-48A5-9F4B-471C0B6D395B}" type="datetimeFigureOut">
               <a:rPr lang="ru-RU" smtClean="0"/>
-              <a:t>17.04.2022</a:t>
+              <a:t>19.04.2022</a:t>
             </a:fld>
             <a:endParaRPr lang="ru-RU"/>
           </a:p>
@@ -457,7 +463,7 @@
           <a:p>
             <a:fld id="{5D8E3154-8C91-48A5-9F4B-471C0B6D395B}" type="datetimeFigureOut">
               <a:rPr lang="ru-RU" smtClean="0"/>
-              <a:t>17.04.2022</a:t>
+              <a:t>19.04.2022</a:t>
             </a:fld>
             <a:endParaRPr lang="ru-RU"/>
           </a:p>
@@ -665,7 +671,7 @@
           <a:p>
             <a:fld id="{5D8E3154-8C91-48A5-9F4B-471C0B6D395B}" type="datetimeFigureOut">
               <a:rPr lang="ru-RU" smtClean="0"/>
-              <a:t>17.04.2022</a:t>
+              <a:t>19.04.2022</a:t>
             </a:fld>
             <a:endParaRPr lang="ru-RU"/>
           </a:p>
@@ -863,7 +869,7 @@
           <a:p>
             <a:fld id="{5D8E3154-8C91-48A5-9F4B-471C0B6D395B}" type="datetimeFigureOut">
               <a:rPr lang="ru-RU" smtClean="0"/>
-              <a:t>17.04.2022</a:t>
+              <a:t>19.04.2022</a:t>
             </a:fld>
             <a:endParaRPr lang="ru-RU"/>
           </a:p>
@@ -1138,7 +1144,7 @@
           <a:p>
             <a:fld id="{5D8E3154-8C91-48A5-9F4B-471C0B6D395B}" type="datetimeFigureOut">
               <a:rPr lang="ru-RU" smtClean="0"/>
-              <a:t>17.04.2022</a:t>
+              <a:t>19.04.2022</a:t>
             </a:fld>
             <a:endParaRPr lang="ru-RU"/>
           </a:p>
@@ -1403,7 +1409,7 @@
           <a:p>
             <a:fld id="{5D8E3154-8C91-48A5-9F4B-471C0B6D395B}" type="datetimeFigureOut">
               <a:rPr lang="ru-RU" smtClean="0"/>
-              <a:t>17.04.2022</a:t>
+              <a:t>19.04.2022</a:t>
             </a:fld>
             <a:endParaRPr lang="ru-RU"/>
           </a:p>
@@ -1815,7 +1821,7 @@
           <a:p>
             <a:fld id="{5D8E3154-8C91-48A5-9F4B-471C0B6D395B}" type="datetimeFigureOut">
               <a:rPr lang="ru-RU" smtClean="0"/>
-              <a:t>17.04.2022</a:t>
+              <a:t>19.04.2022</a:t>
             </a:fld>
             <a:endParaRPr lang="ru-RU"/>
           </a:p>
@@ -1956,7 +1962,7 @@
           <a:p>
             <a:fld id="{5D8E3154-8C91-48A5-9F4B-471C0B6D395B}" type="datetimeFigureOut">
               <a:rPr lang="ru-RU" smtClean="0"/>
-              <a:t>17.04.2022</a:t>
+              <a:t>19.04.2022</a:t>
             </a:fld>
             <a:endParaRPr lang="ru-RU"/>
           </a:p>
@@ -2069,7 +2075,7 @@
           <a:p>
             <a:fld id="{5D8E3154-8C91-48A5-9F4B-471C0B6D395B}" type="datetimeFigureOut">
               <a:rPr lang="ru-RU" smtClean="0"/>
-              <a:t>17.04.2022</a:t>
+              <a:t>19.04.2022</a:t>
             </a:fld>
             <a:endParaRPr lang="ru-RU"/>
           </a:p>
@@ -2380,7 +2386,7 @@
           <a:p>
             <a:fld id="{5D8E3154-8C91-48A5-9F4B-471C0B6D395B}" type="datetimeFigureOut">
               <a:rPr lang="ru-RU" smtClean="0"/>
-              <a:t>17.04.2022</a:t>
+              <a:t>19.04.2022</a:t>
             </a:fld>
             <a:endParaRPr lang="ru-RU"/>
           </a:p>
@@ -2668,7 +2674,7 @@
           <a:p>
             <a:fld id="{5D8E3154-8C91-48A5-9F4B-471C0B6D395B}" type="datetimeFigureOut">
               <a:rPr lang="ru-RU" smtClean="0"/>
-              <a:t>17.04.2022</a:t>
+              <a:t>19.04.2022</a:t>
             </a:fld>
             <a:endParaRPr lang="ru-RU"/>
           </a:p>
@@ -2909,7 +2915,7 @@
           <a:p>
             <a:fld id="{5D8E3154-8C91-48A5-9F4B-471C0B6D395B}" type="datetimeFigureOut">
               <a:rPr lang="ru-RU" smtClean="0"/>
-              <a:t>17.04.2022</a:t>
+              <a:t>19.04.2022</a:t>
             </a:fld>
             <a:endParaRPr lang="ru-RU"/>
           </a:p>
@@ -3733,7 +3739,7 @@
           <p:cNvPr id="2" name="Заголовок 1">
             <a:extLst>
               <a:ext uri="{FF2B5EF4-FFF2-40B4-BE49-F238E27FC236}">
-                <a16:creationId xmlns:a16="http://schemas.microsoft.com/office/drawing/2014/main" id="{1523BCD7-5172-4494-932A-61658038B8EF}"/>
+                <a16:creationId xmlns:a16="http://schemas.microsoft.com/office/drawing/2014/main" id="{BE43F72F-611F-4A5C-B45F-40A2A98B3BEF}"/>
               </a:ext>
             </a:extLst>
           </p:cNvPr>
@@ -3744,122 +3750,63 @@
             <p:ph type="title"/>
           </p:nvPr>
         </p:nvSpPr>
-        <p:spPr/>
-        <p:txBody>
-          <a:bodyPr/>
-          <a:lstStyle/>
-          <a:p>
-            <a:r>
-              <a:rPr lang="ru-RU" dirty="0"/>
-              <a:t>Обзор страниц</a:t>
-            </a:r>
-          </a:p>
-        </p:txBody>
-      </p:sp>
-      <p:sp>
-        <p:nvSpPr>
-          <p:cNvPr id="3" name="Объект 2">
-            <a:extLst>
-              <a:ext uri="{FF2B5EF4-FFF2-40B4-BE49-F238E27FC236}">
-                <a16:creationId xmlns:a16="http://schemas.microsoft.com/office/drawing/2014/main" id="{D68DB04B-7D21-469A-84D6-A82B9FD6C1E7}"/>
-              </a:ext>
-            </a:extLst>
-          </p:cNvPr>
-          <p:cNvSpPr>
-            <a:spLocks noGrp="1"/>
-          </p:cNvSpPr>
+        <p:spPr>
+          <a:xfrm>
+            <a:off x="0" y="0"/>
+            <a:ext cx="5901267" cy="372533"/>
+          </a:xfrm>
+        </p:spPr>
+        <p:txBody>
+          <a:bodyPr>
+            <a:normAutofit/>
+          </a:bodyPr>
+          <a:lstStyle/>
+          <a:p>
+            <a:r>
+              <a:rPr lang="ru-RU" sz="2000" dirty="0"/>
+              <a:t>Собственно, статистика с </a:t>
+            </a:r>
+            <a:r>
+              <a:rPr lang="en-US" sz="2000" dirty="0" err="1"/>
+              <a:t>cloudflare</a:t>
+            </a:r>
+            <a:endParaRPr lang="ru-RU" sz="2000" dirty="0"/>
+          </a:p>
+        </p:txBody>
+      </p:sp>
+      <p:pic>
+        <p:nvPicPr>
+          <p:cNvPr id="5" name="Объект 4">
+            <a:extLst>
+              <a:ext uri="{FF2B5EF4-FFF2-40B4-BE49-F238E27FC236}">
+                <a16:creationId xmlns:a16="http://schemas.microsoft.com/office/drawing/2014/main" id="{5812D184-51F9-4DBD-B652-09CCC90877A9}"/>
+              </a:ext>
+            </a:extLst>
+          </p:cNvPr>
+          <p:cNvPicPr>
+            <a:picLocks noGrp="1" noChangeAspect="1"/>
+          </p:cNvPicPr>
           <p:nvPr>
             <p:ph idx="1"/>
           </p:nvPr>
-        </p:nvSpPr>
-        <p:spPr/>
-        <p:txBody>
-          <a:bodyPr/>
-          <a:lstStyle/>
-          <a:p>
-            <a:r>
-              <a:rPr lang="ru-RU" dirty="0"/>
-              <a:t>Главная страница – </a:t>
-            </a:r>
-            <a:r>
-              <a:rPr lang="en-US" dirty="0"/>
-              <a:t>/</a:t>
-            </a:r>
-          </a:p>
-          <a:p>
-            <a:r>
-              <a:rPr lang="ru-RU" dirty="0"/>
-              <a:t>Страница с созданием аккаунта и входом в существующий – </a:t>
-            </a:r>
-            <a:r>
-              <a:rPr lang="en-US" dirty="0"/>
-              <a:t>/</a:t>
-            </a:r>
-            <a:r>
-              <a:rPr lang="en-US" dirty="0" err="1"/>
-              <a:t>create_account</a:t>
-            </a:r>
-            <a:endParaRPr lang="en-US" dirty="0"/>
-          </a:p>
-          <a:p>
-            <a:r>
-              <a:rPr lang="ru-RU" dirty="0"/>
-              <a:t>Страница с самим аккаунтом, где можно из него выйти(в будущем будут еще фичи) - </a:t>
-            </a:r>
-            <a:r>
-              <a:rPr lang="en-US" dirty="0"/>
-              <a:t>/account</a:t>
-            </a:r>
-          </a:p>
-          <a:p>
-            <a:r>
-              <a:rPr lang="ru-RU" dirty="0"/>
-              <a:t>Страница с созданием опросов </a:t>
-            </a:r>
-            <a:r>
-              <a:rPr lang="en-US" dirty="0"/>
-              <a:t>- /</a:t>
-            </a:r>
-            <a:r>
-              <a:rPr lang="en-US" dirty="0" err="1"/>
-              <a:t>create_poll</a:t>
-            </a:r>
-            <a:endParaRPr lang="en-US" dirty="0"/>
-          </a:p>
-          <a:p>
-            <a:r>
-              <a:rPr lang="ru-RU" dirty="0"/>
-              <a:t>Страница с опросом - </a:t>
-            </a:r>
-            <a:r>
-              <a:rPr lang="en-US" dirty="0"/>
-              <a:t>/</a:t>
-            </a:r>
-            <a:r>
-              <a:rPr lang="en-US" dirty="0" err="1"/>
-              <a:t>poll?poll</a:t>
-            </a:r>
-            <a:r>
-              <a:rPr lang="en-US" dirty="0"/>
-              <a:t>={poll.id}</a:t>
-            </a:r>
-            <a:endParaRPr lang="ru-RU" dirty="0"/>
-          </a:p>
-          <a:p>
-            <a:pPr marL="0" indent="0">
-              <a:buNone/>
-            </a:pPr>
-            <a:r>
-              <a:rPr lang="ru-RU" dirty="0"/>
-              <a:t>Не считаю, что нужно вставлять какие-либо картинки, ибо вы сами можете посмотреть что нужно просто введя ссылку в браузер.</a:t>
-            </a:r>
-          </a:p>
-        </p:txBody>
-      </p:sp>
+        </p:nvPicPr>
+        <p:blipFill>
+          <a:blip r:embed="rId2"/>
+          <a:stretch>
+            <a:fillRect/>
+          </a:stretch>
+        </p:blipFill>
+        <p:spPr>
+          <a:xfrm>
+            <a:off x="1584787" y="301624"/>
+            <a:ext cx="9022425" cy="6443442"/>
+          </a:xfrm>
+        </p:spPr>
+      </p:pic>
     </p:spTree>
     <p:extLst>
       <p:ext uri="{BB962C8B-B14F-4D97-AF65-F5344CB8AC3E}">
-        <p14:creationId xmlns:p14="http://schemas.microsoft.com/office/powerpoint/2010/main" val="697094011"/>
+        <p14:creationId xmlns:p14="http://schemas.microsoft.com/office/powerpoint/2010/main" val="3462953699"/>
       </p:ext>
     </p:extLst>
   </p:cSld>
@@ -3891,6 +3838,164 @@
           <p:cNvPr id="2" name="Заголовок 1">
             <a:extLst>
               <a:ext uri="{FF2B5EF4-FFF2-40B4-BE49-F238E27FC236}">
+                <a16:creationId xmlns:a16="http://schemas.microsoft.com/office/drawing/2014/main" id="{1523BCD7-5172-4494-932A-61658038B8EF}"/>
+              </a:ext>
+            </a:extLst>
+          </p:cNvPr>
+          <p:cNvSpPr>
+            <a:spLocks noGrp="1"/>
+          </p:cNvSpPr>
+          <p:nvPr>
+            <p:ph type="title"/>
+          </p:nvPr>
+        </p:nvSpPr>
+        <p:spPr/>
+        <p:txBody>
+          <a:bodyPr/>
+          <a:lstStyle/>
+          <a:p>
+            <a:r>
+              <a:rPr lang="ru-RU" dirty="0"/>
+              <a:t>Обзор страниц</a:t>
+            </a:r>
+          </a:p>
+        </p:txBody>
+      </p:sp>
+      <p:sp>
+        <p:nvSpPr>
+          <p:cNvPr id="3" name="Объект 2">
+            <a:extLst>
+              <a:ext uri="{FF2B5EF4-FFF2-40B4-BE49-F238E27FC236}">
+                <a16:creationId xmlns:a16="http://schemas.microsoft.com/office/drawing/2014/main" id="{D68DB04B-7D21-469A-84D6-A82B9FD6C1E7}"/>
+              </a:ext>
+            </a:extLst>
+          </p:cNvPr>
+          <p:cNvSpPr>
+            <a:spLocks noGrp="1"/>
+          </p:cNvSpPr>
+          <p:nvPr>
+            <p:ph idx="1"/>
+          </p:nvPr>
+        </p:nvSpPr>
+        <p:spPr/>
+        <p:txBody>
+          <a:bodyPr/>
+          <a:lstStyle/>
+          <a:p>
+            <a:r>
+              <a:rPr lang="ru-RU" dirty="0"/>
+              <a:t>Главная страница – </a:t>
+            </a:r>
+            <a:r>
+              <a:rPr lang="en-US" dirty="0"/>
+              <a:t>/</a:t>
+            </a:r>
+          </a:p>
+          <a:p>
+            <a:r>
+              <a:rPr lang="ru-RU" dirty="0"/>
+              <a:t>Страница с созданием аккаунта и входом в существующий – </a:t>
+            </a:r>
+            <a:r>
+              <a:rPr lang="en-US" dirty="0"/>
+              <a:t>/</a:t>
+            </a:r>
+            <a:r>
+              <a:rPr lang="en-US" dirty="0" err="1"/>
+              <a:t>create_account</a:t>
+            </a:r>
+            <a:endParaRPr lang="en-US" dirty="0"/>
+          </a:p>
+          <a:p>
+            <a:r>
+              <a:rPr lang="ru-RU" dirty="0"/>
+              <a:t>Страница с самим аккаунтом, где можно из него выйти(в будущем будут еще фичи) - </a:t>
+            </a:r>
+            <a:r>
+              <a:rPr lang="en-US" dirty="0"/>
+              <a:t>/account</a:t>
+            </a:r>
+          </a:p>
+          <a:p>
+            <a:r>
+              <a:rPr lang="ru-RU" dirty="0"/>
+              <a:t>Страница с созданием опросов </a:t>
+            </a:r>
+            <a:r>
+              <a:rPr lang="en-US" dirty="0"/>
+              <a:t>- /</a:t>
+            </a:r>
+            <a:r>
+              <a:rPr lang="en-US" dirty="0" err="1"/>
+              <a:t>create_poll</a:t>
+            </a:r>
+            <a:endParaRPr lang="en-US" dirty="0"/>
+          </a:p>
+          <a:p>
+            <a:r>
+              <a:rPr lang="ru-RU" dirty="0"/>
+              <a:t>Страница с опросом - </a:t>
+            </a:r>
+            <a:r>
+              <a:rPr lang="en-US" dirty="0"/>
+              <a:t>/</a:t>
+            </a:r>
+            <a:r>
+              <a:rPr lang="en-US" dirty="0" err="1"/>
+              <a:t>poll?poll</a:t>
+            </a:r>
+            <a:r>
+              <a:rPr lang="en-US" dirty="0"/>
+              <a:t>={poll.id}</a:t>
+            </a:r>
+            <a:endParaRPr lang="ru-RU" dirty="0"/>
+          </a:p>
+          <a:p>
+            <a:pPr marL="0" indent="0">
+              <a:buNone/>
+            </a:pPr>
+            <a:r>
+              <a:rPr lang="ru-RU" dirty="0"/>
+              <a:t>Не считаю, что нужно вставлять какие-либо картинки, ибо вы сами можете посмотреть что нужно просто введя ссылку в браузер.</a:t>
+            </a:r>
+          </a:p>
+        </p:txBody>
+      </p:sp>
+    </p:spTree>
+    <p:extLst>
+      <p:ext uri="{BB962C8B-B14F-4D97-AF65-F5344CB8AC3E}">
+        <p14:creationId xmlns:p14="http://schemas.microsoft.com/office/powerpoint/2010/main" val="697094011"/>
+      </p:ext>
+    </p:extLst>
+  </p:cSld>
+  <p:clrMapOvr>
+    <a:masterClrMapping/>
+  </p:clrMapOvr>
+</p:sld>
+</file>
+
+<file path=ppt/slides/slide6.xml><?xml version="1.0" encoding="utf-8"?>
+<p:sld xmlns:a="http://schemas.openxmlformats.org/drawingml/2006/main" xmlns:r="http://schemas.openxmlformats.org/officeDocument/2006/relationships" xmlns:p="http://schemas.openxmlformats.org/presentationml/2006/main">
+  <p:cSld>
+    <p:spTree>
+      <p:nvGrpSpPr>
+        <p:cNvPr id="1" name=""/>
+        <p:cNvGrpSpPr/>
+        <p:nvPr/>
+      </p:nvGrpSpPr>
+      <p:grpSpPr>
+        <a:xfrm>
+          <a:off x="0" y="0"/>
+          <a:ext cx="0" cy="0"/>
+          <a:chOff x="0" y="0"/>
+          <a:chExt cx="0" cy="0"/>
+        </a:xfrm>
+      </p:grpSpPr>
+      <p:sp>
+        <p:nvSpPr>
+          <p:cNvPr id="2" name="Заголовок 1">
+            <a:extLst>
+              <a:ext uri="{FF2B5EF4-FFF2-40B4-BE49-F238E27FC236}">
                 <a16:creationId xmlns:a16="http://schemas.microsoft.com/office/drawing/2014/main" id="{E151291A-2CCB-4277-88EF-D91E93678A2F}"/>
               </a:ext>
             </a:extLst>
@@ -4055,7 +4160,7 @@
 </p:sld>
 </file>
 
-<file path=ppt/slides/slide6.xml><?xml version="1.0" encoding="utf-8"?>
+<file path=ppt/slides/slide7.xml><?xml version="1.0" encoding="utf-8"?>
 <p:sld xmlns:a="http://schemas.openxmlformats.org/drawingml/2006/main" xmlns:r="http://schemas.openxmlformats.org/officeDocument/2006/relationships" xmlns:p="http://schemas.openxmlformats.org/presentationml/2006/main">
   <p:cSld>
     <p:spTree>

</xml_diff>

<commit_message>
many comments addition + code formatter + some small fixes
</commit_message>
<xml_diff>
--- a/MegaPolls.pptx
+++ b/MegaPolls.pptx
@@ -265,7 +265,7 @@
           <a:p>
             <a:fld id="{5D8E3154-8C91-48A5-9F4B-471C0B6D395B}" type="datetimeFigureOut">
               <a:rPr lang="ru-RU" smtClean="0"/>
-              <a:t>19.04.2022</a:t>
+              <a:t>24.04.2022</a:t>
             </a:fld>
             <a:endParaRPr lang="ru-RU"/>
           </a:p>
@@ -463,7 +463,7 @@
           <a:p>
             <a:fld id="{5D8E3154-8C91-48A5-9F4B-471C0B6D395B}" type="datetimeFigureOut">
               <a:rPr lang="ru-RU" smtClean="0"/>
-              <a:t>19.04.2022</a:t>
+              <a:t>24.04.2022</a:t>
             </a:fld>
             <a:endParaRPr lang="ru-RU"/>
           </a:p>
@@ -671,7 +671,7 @@
           <a:p>
             <a:fld id="{5D8E3154-8C91-48A5-9F4B-471C0B6D395B}" type="datetimeFigureOut">
               <a:rPr lang="ru-RU" smtClean="0"/>
-              <a:t>19.04.2022</a:t>
+              <a:t>24.04.2022</a:t>
             </a:fld>
             <a:endParaRPr lang="ru-RU"/>
           </a:p>
@@ -869,7 +869,7 @@
           <a:p>
             <a:fld id="{5D8E3154-8C91-48A5-9F4B-471C0B6D395B}" type="datetimeFigureOut">
               <a:rPr lang="ru-RU" smtClean="0"/>
-              <a:t>19.04.2022</a:t>
+              <a:t>24.04.2022</a:t>
             </a:fld>
             <a:endParaRPr lang="ru-RU"/>
           </a:p>
@@ -1144,7 +1144,7 @@
           <a:p>
             <a:fld id="{5D8E3154-8C91-48A5-9F4B-471C0B6D395B}" type="datetimeFigureOut">
               <a:rPr lang="ru-RU" smtClean="0"/>
-              <a:t>19.04.2022</a:t>
+              <a:t>24.04.2022</a:t>
             </a:fld>
             <a:endParaRPr lang="ru-RU"/>
           </a:p>
@@ -1409,7 +1409,7 @@
           <a:p>
             <a:fld id="{5D8E3154-8C91-48A5-9F4B-471C0B6D395B}" type="datetimeFigureOut">
               <a:rPr lang="ru-RU" smtClean="0"/>
-              <a:t>19.04.2022</a:t>
+              <a:t>24.04.2022</a:t>
             </a:fld>
             <a:endParaRPr lang="ru-RU"/>
           </a:p>
@@ -1821,7 +1821,7 @@
           <a:p>
             <a:fld id="{5D8E3154-8C91-48A5-9F4B-471C0B6D395B}" type="datetimeFigureOut">
               <a:rPr lang="ru-RU" smtClean="0"/>
-              <a:t>19.04.2022</a:t>
+              <a:t>24.04.2022</a:t>
             </a:fld>
             <a:endParaRPr lang="ru-RU"/>
           </a:p>
@@ -1962,7 +1962,7 @@
           <a:p>
             <a:fld id="{5D8E3154-8C91-48A5-9F4B-471C0B6D395B}" type="datetimeFigureOut">
               <a:rPr lang="ru-RU" smtClean="0"/>
-              <a:t>19.04.2022</a:t>
+              <a:t>24.04.2022</a:t>
             </a:fld>
             <a:endParaRPr lang="ru-RU"/>
           </a:p>
@@ -2075,7 +2075,7 @@
           <a:p>
             <a:fld id="{5D8E3154-8C91-48A5-9F4B-471C0B6D395B}" type="datetimeFigureOut">
               <a:rPr lang="ru-RU" smtClean="0"/>
-              <a:t>19.04.2022</a:t>
+              <a:t>24.04.2022</a:t>
             </a:fld>
             <a:endParaRPr lang="ru-RU"/>
           </a:p>
@@ -2386,7 +2386,7 @@
           <a:p>
             <a:fld id="{5D8E3154-8C91-48A5-9F4B-471C0B6D395B}" type="datetimeFigureOut">
               <a:rPr lang="ru-RU" smtClean="0"/>
-              <a:t>19.04.2022</a:t>
+              <a:t>24.04.2022</a:t>
             </a:fld>
             <a:endParaRPr lang="ru-RU"/>
           </a:p>
@@ -2674,7 +2674,7 @@
           <a:p>
             <a:fld id="{5D8E3154-8C91-48A5-9F4B-471C0B6D395B}" type="datetimeFigureOut">
               <a:rPr lang="ru-RU" smtClean="0"/>
-              <a:t>19.04.2022</a:t>
+              <a:t>24.04.2022</a:t>
             </a:fld>
             <a:endParaRPr lang="ru-RU"/>
           </a:p>
@@ -2915,7 +2915,7 @@
           <a:p>
             <a:fld id="{5D8E3154-8C91-48A5-9F4B-471C0B6D395B}" type="datetimeFigureOut">
               <a:rPr lang="ru-RU" smtClean="0"/>
-              <a:t>19.04.2022</a:t>
+              <a:t>24.04.2022</a:t>
             </a:fld>
             <a:endParaRPr lang="ru-RU"/>
           </a:p>
@@ -3451,7 +3451,7 @@
           <a:p>
             <a:r>
               <a:rPr lang="ru-RU" dirty="0"/>
-              <a:t>Соль</a:t>
+              <a:t>В чем соль?</a:t>
             </a:r>
           </a:p>
         </p:txBody>
@@ -3530,11 +3530,58 @@
             </a:r>
             <a:r>
               <a:rPr lang="ru-RU" dirty="0"/>
-              <a:t> сайт, где можно легко и быстро создать опрос, а потом посмотреть его результаты. Проект сейчас на начальной стадии, ибо в опросы можно добавлять бесконечное кол-во фич, если будет время – потом некоторые из них будут воплощены в жизнь.</a:t>
-            </a:r>
-          </a:p>
-        </p:txBody>
-      </p:sp>
+              <a:t> сайт, где можно легко и быстро создать опрос, а потом посмотреть его результаты. Проект сейчас на начальной стадии, ибо в опросы можно добавлять бесконечное кол-во фич, пока их немного, но в будущем сайт будет развиваться.</a:t>
+            </a:r>
+          </a:p>
+        </p:txBody>
+      </p:sp>
+      <p:pic>
+        <p:nvPicPr>
+          <p:cNvPr id="5124" name="Picture 4" descr="Salt - Free food icons">
+            <a:extLst>
+              <a:ext uri="{FF2B5EF4-FFF2-40B4-BE49-F238E27FC236}">
+                <a16:creationId xmlns:a16="http://schemas.microsoft.com/office/drawing/2014/main" id="{7E6328B5-7616-4C6C-9540-35A30CA50E32}"/>
+              </a:ext>
+            </a:extLst>
+          </p:cNvPr>
+          <p:cNvPicPr>
+            <a:picLocks noChangeAspect="1" noChangeArrowheads="1"/>
+          </p:cNvPicPr>
+          <p:nvPr/>
+        </p:nvPicPr>
+        <p:blipFill>
+          <a:blip r:embed="rId2">
+            <a:extLst>
+              <a:ext uri="{28A0092B-C50C-407E-A947-70E740481C1C}">
+                <a14:useLocalDpi xmlns:a14="http://schemas.microsoft.com/office/drawing/2010/main" val="0"/>
+              </a:ext>
+            </a:extLst>
+          </a:blip>
+          <a:srcRect/>
+          <a:stretch>
+            <a:fillRect/>
+          </a:stretch>
+        </p:blipFill>
+        <p:spPr bwMode="auto">
+          <a:xfrm>
+            <a:off x="9491133" y="132557"/>
+            <a:ext cx="1625600" cy="1625600"/>
+          </a:xfrm>
+          <a:prstGeom prst="rect">
+            <a:avLst/>
+          </a:prstGeom>
+          <a:noFill/>
+          <a:extLst>
+            <a:ext uri="{909E8E84-426E-40DD-AFC4-6F175D3DCCD1}">
+              <a14:hiddenFill xmlns:a14="http://schemas.microsoft.com/office/drawing/2010/main">
+                <a:solidFill>
+                  <a:srgbClr val="FFFFFF"/>
+                </a:solidFill>
+              </a14:hiddenFill>
+            </a:ext>
+          </a:extLst>
+        </p:spPr>
+      </p:pic>
     </p:spTree>
     <p:extLst>
       <p:ext uri="{BB962C8B-B14F-4D97-AF65-F5344CB8AC3E}">
@@ -3588,7 +3635,7 @@
           <a:p>
             <a:r>
               <a:rPr lang="ru-RU" dirty="0"/>
-              <a:t>Приколы</a:t>
+              <a:t>Заметочки</a:t>
             </a:r>
           </a:p>
         </p:txBody>
@@ -3640,7 +3687,7 @@
             </a:r>
             <a:r>
               <a:rPr lang="ru-RU" dirty="0"/>
-              <a:t>красиво написанных строк на </a:t>
+              <a:t>строк на </a:t>
             </a:r>
             <a:r>
               <a:rPr lang="en-US" dirty="0"/>
@@ -3699,11 +3746,58 @@
             </a:r>
             <a:r>
               <a:rPr lang="ru-RU" dirty="0"/>
-              <a:t>не предоставляет. Но зато теперь у меня есть статистика сайта, за первую неделю было 250 посещений.</a:t>
-            </a:r>
-          </a:p>
-        </p:txBody>
-      </p:sp>
+              <a:t>не предоставляет. Но зато теперь у меня есть статистика сайта, за первую неделю было 250+ посещений.</a:t>
+            </a:r>
+          </a:p>
+        </p:txBody>
+      </p:sp>
+      <p:pic>
+        <p:nvPicPr>
+          <p:cNvPr id="3074" name="Picture 2" descr="Notes Svg Png Icon Free Download (#18374) - OnlineWebFonts.COM">
+            <a:extLst>
+              <a:ext uri="{FF2B5EF4-FFF2-40B4-BE49-F238E27FC236}">
+                <a16:creationId xmlns:a16="http://schemas.microsoft.com/office/drawing/2014/main" id="{E0306EF7-A0B3-4FE6-B7F3-85BD42AD7934}"/>
+              </a:ext>
+            </a:extLst>
+          </p:cNvPr>
+          <p:cNvPicPr>
+            <a:picLocks noChangeAspect="1" noChangeArrowheads="1"/>
+          </p:cNvPicPr>
+          <p:nvPr/>
+        </p:nvPicPr>
+        <p:blipFill>
+          <a:blip r:embed="rId2">
+            <a:extLst>
+              <a:ext uri="{28A0092B-C50C-407E-A947-70E740481C1C}">
+                <a14:useLocalDpi xmlns:a14="http://schemas.microsoft.com/office/drawing/2010/main" val="0"/>
+              </a:ext>
+            </a:extLst>
+          </a:blip>
+          <a:srcRect/>
+          <a:stretch>
+            <a:fillRect/>
+          </a:stretch>
+        </p:blipFill>
+        <p:spPr bwMode="auto">
+          <a:xfrm>
+            <a:off x="10162146" y="297127"/>
+            <a:ext cx="1191654" cy="1397000"/>
+          </a:xfrm>
+          <a:prstGeom prst="rect">
+            <a:avLst/>
+          </a:prstGeom>
+          <a:noFill/>
+          <a:extLst>
+            <a:ext uri="{909E8E84-426E-40DD-AFC4-6F175D3DCCD1}">
+              <a14:hiddenFill xmlns:a14="http://schemas.microsoft.com/office/drawing/2010/main">
+                <a:solidFill>
+                  <a:srgbClr val="FFFFFF"/>
+                </a:solidFill>
+              </a14:hiddenFill>
+            </a:ext>
+          </a:extLst>
+        </p:spPr>
+      </p:pic>
     </p:spTree>
     <p:extLst>
       <p:ext uri="{BB962C8B-B14F-4D97-AF65-F5344CB8AC3E}">
@@ -3801,6 +3895,53 @@
             <a:off x="1584787" y="301624"/>
             <a:ext cx="9022425" cy="6443442"/>
           </a:xfrm>
+        </p:spPr>
+      </p:pic>
+      <p:pic>
+        <p:nvPicPr>
+          <p:cNvPr id="4098" name="Picture 2" descr="Stats Glyph Black Icon 512272 Vector Art at Vecteezy">
+            <a:extLst>
+              <a:ext uri="{FF2B5EF4-FFF2-40B4-BE49-F238E27FC236}">
+                <a16:creationId xmlns:a16="http://schemas.microsoft.com/office/drawing/2014/main" id="{014F1C76-A5F9-46CA-B542-8D42EF3CB4F7}"/>
+              </a:ext>
+            </a:extLst>
+          </p:cNvPr>
+          <p:cNvPicPr>
+            <a:picLocks noChangeAspect="1" noChangeArrowheads="1"/>
+          </p:cNvPicPr>
+          <p:nvPr/>
+        </p:nvPicPr>
+        <p:blipFill>
+          <a:blip r:embed="rId3">
+            <a:extLst>
+              <a:ext uri="{28A0092B-C50C-407E-A947-70E740481C1C}">
+                <a14:useLocalDpi xmlns:a14="http://schemas.microsoft.com/office/drawing/2010/main" val="0"/>
+              </a:ext>
+            </a:extLst>
+          </a:blip>
+          <a:srcRect/>
+          <a:stretch>
+            <a:fillRect/>
+          </a:stretch>
+        </p:blipFill>
+        <p:spPr bwMode="auto">
+          <a:xfrm>
+            <a:off x="10684934" y="186266"/>
+            <a:ext cx="1325562" cy="1325562"/>
+          </a:xfrm>
+          <a:prstGeom prst="rect">
+            <a:avLst/>
+          </a:prstGeom>
+          <a:noFill/>
+          <a:extLst>
+            <a:ext uri="{909E8E84-426E-40DD-AFC4-6F175D3DCCD1}">
+              <a14:hiddenFill xmlns:a14="http://schemas.microsoft.com/office/drawing/2010/main">
+                <a:solidFill>
+                  <a:srgbClr val="FFFFFF"/>
+                </a:solidFill>
+              </a14:hiddenFill>
+            </a:ext>
+          </a:extLst>
         </p:spPr>
       </p:pic>
     </p:spTree>
@@ -3879,8 +4020,27 @@
         </p:nvSpPr>
         <p:spPr/>
         <p:txBody>
-          <a:bodyPr/>
-          <a:lstStyle/>
+          <a:bodyPr>
+            <a:normAutofit lnSpcReduction="10000"/>
+          </a:bodyPr>
+          <a:lstStyle/>
+          <a:p>
+            <a:pPr marL="0" indent="0">
+              <a:buNone/>
+            </a:pPr>
+            <a:r>
+              <a:rPr lang="ru-RU" dirty="0"/>
+              <a:t>Не считаю, что нужно вставлять какие-либо картинки, ибо вы сами можете посмотреть что нужно</a:t>
+            </a:r>
+            <a:r>
+              <a:rPr lang="en-US" dirty="0"/>
+              <a:t> (</a:t>
+            </a:r>
+            <a:r>
+              <a:rPr lang="ru-RU" dirty="0"/>
+              <a:t>и еще потыкать на кнопочки) просто введя ссылку в браузер.</a:t>
+            </a:r>
+          </a:p>
           <a:p>
             <a:r>
               <a:rPr lang="ru-RU" dirty="0"/>
@@ -3950,17 +4110,55 @@
             </a:r>
             <a:endParaRPr lang="ru-RU" dirty="0"/>
           </a:p>
-          <a:p>
-            <a:pPr marL="0" indent="0">
-              <a:buNone/>
-            </a:pPr>
-            <a:r>
-              <a:rPr lang="ru-RU" dirty="0"/>
-              <a:t>Не считаю, что нужно вставлять какие-либо картинки, ибо вы сами можете посмотреть что нужно просто введя ссылку в браузер.</a:t>
-            </a:r>
-          </a:p>
-        </p:txBody>
-      </p:sp>
+        </p:txBody>
+      </p:sp>
+      <p:pic>
+        <p:nvPicPr>
+          <p:cNvPr id="2050" name="Picture 2" descr="pages Icon - Download pages Icon 55209 | Noun Project">
+            <a:extLst>
+              <a:ext uri="{FF2B5EF4-FFF2-40B4-BE49-F238E27FC236}">
+                <a16:creationId xmlns:a16="http://schemas.microsoft.com/office/drawing/2014/main" id="{FE3C4743-E395-4EBD-A36D-F30AD273C20F}"/>
+              </a:ext>
+            </a:extLst>
+          </p:cNvPr>
+          <p:cNvPicPr>
+            <a:picLocks noChangeAspect="1" noChangeArrowheads="1"/>
+          </p:cNvPicPr>
+          <p:nvPr/>
+        </p:nvPicPr>
+        <p:blipFill>
+          <a:blip r:embed="rId2">
+            <a:extLst>
+              <a:ext uri="{28A0092B-C50C-407E-A947-70E740481C1C}">
+                <a14:useLocalDpi xmlns:a14="http://schemas.microsoft.com/office/drawing/2010/main" val="0"/>
+              </a:ext>
+            </a:extLst>
+          </a:blip>
+          <a:srcRect/>
+          <a:stretch>
+            <a:fillRect/>
+          </a:stretch>
+        </p:blipFill>
+        <p:spPr bwMode="auto">
+          <a:xfrm>
+            <a:off x="10007600" y="230188"/>
+            <a:ext cx="1460500" cy="1460500"/>
+          </a:xfrm>
+          <a:prstGeom prst="rect">
+            <a:avLst/>
+          </a:prstGeom>
+          <a:noFill/>
+          <a:extLst>
+            <a:ext uri="{909E8E84-426E-40DD-AFC4-6F175D3DCCD1}">
+              <a14:hiddenFill xmlns:a14="http://schemas.microsoft.com/office/drawing/2010/main">
+                <a:solidFill>
+                  <a:srgbClr val="FFFFFF"/>
+                </a:solidFill>
+              </a14:hiddenFill>
+            </a:ext>
+          </a:extLst>
+        </p:spPr>
+      </p:pic>
     </p:spTree>
     <p:extLst>
       <p:ext uri="{BB962C8B-B14F-4D97-AF65-F5344CB8AC3E}">
@@ -4147,6 +4345,135 @@
           </a:p>
         </p:txBody>
       </p:sp>
+      <p:pic>
+        <p:nvPicPr>
+          <p:cNvPr id="1032" name="Picture 8" descr="Логотип github – Бесплатные иконки: социальные медиа">
+            <a:extLst>
+              <a:ext uri="{FF2B5EF4-FFF2-40B4-BE49-F238E27FC236}">
+                <a16:creationId xmlns:a16="http://schemas.microsoft.com/office/drawing/2014/main" id="{571C56E4-B5EB-4EC2-93FB-87A73CA478CE}"/>
+              </a:ext>
+            </a:extLst>
+          </p:cNvPr>
+          <p:cNvPicPr>
+            <a:picLocks noChangeAspect="1" noChangeArrowheads="1"/>
+          </p:cNvPicPr>
+          <p:nvPr/>
+        </p:nvPicPr>
+        <p:blipFill>
+          <a:blip r:embed="rId2">
+            <a:extLst>
+              <a:ext uri="{28A0092B-C50C-407E-A947-70E740481C1C}">
+                <a14:useLocalDpi xmlns:a14="http://schemas.microsoft.com/office/drawing/2010/main" val="0"/>
+              </a:ext>
+            </a:extLst>
+          </a:blip>
+          <a:srcRect/>
+          <a:stretch>
+            <a:fillRect/>
+          </a:stretch>
+        </p:blipFill>
+        <p:spPr bwMode="auto">
+          <a:xfrm>
+            <a:off x="6695689" y="305855"/>
+            <a:ext cx="1442508" cy="1442508"/>
+          </a:xfrm>
+          <a:prstGeom prst="rect">
+            <a:avLst/>
+          </a:prstGeom>
+          <a:noFill/>
+          <a:extLst>
+            <a:ext uri="{909E8E84-426E-40DD-AFC4-6F175D3DCCD1}">
+              <a14:hiddenFill xmlns:a14="http://schemas.microsoft.com/office/drawing/2010/main">
+                <a:solidFill>
+                  <a:srgbClr val="FFFFFF"/>
+                </a:solidFill>
+              </a14:hiddenFill>
+            </a:ext>
+          </a:extLst>
+        </p:spPr>
+      </p:pic>
+      <p:pic>
+        <p:nvPicPr>
+          <p:cNvPr id="1034" name="Picture 10" descr="File, type, flutter Free Icon - Icon-Icons.com">
+            <a:extLst>
+              <a:ext uri="{FF2B5EF4-FFF2-40B4-BE49-F238E27FC236}">
+                <a16:creationId xmlns:a16="http://schemas.microsoft.com/office/drawing/2014/main" id="{F706AAD2-5E5B-4BB7-B4E4-A138CB3D8997}"/>
+              </a:ext>
+            </a:extLst>
+          </p:cNvPr>
+          <p:cNvPicPr>
+            <a:picLocks noChangeAspect="1" noChangeArrowheads="1"/>
+          </p:cNvPicPr>
+          <p:nvPr/>
+        </p:nvPicPr>
+        <p:blipFill>
+          <a:blip r:embed="rId3">
+            <a:extLst>
+              <a:ext uri="{28A0092B-C50C-407E-A947-70E740481C1C}">
+                <a14:useLocalDpi xmlns:a14="http://schemas.microsoft.com/office/drawing/2010/main" val="0"/>
+              </a:ext>
+            </a:extLst>
+          </a:blip>
+          <a:srcRect/>
+          <a:stretch>
+            <a:fillRect/>
+          </a:stretch>
+        </p:blipFill>
+        <p:spPr bwMode="auto">
+          <a:xfrm>
+            <a:off x="9004829" y="400575"/>
+            <a:ext cx="1253067" cy="1253067"/>
+          </a:xfrm>
+          <a:prstGeom prst="rect">
+            <a:avLst/>
+          </a:prstGeom>
+          <a:noFill/>
+          <a:extLst>
+            <a:ext uri="{909E8E84-426E-40DD-AFC4-6F175D3DCCD1}">
+              <a14:hiddenFill xmlns:a14="http://schemas.microsoft.com/office/drawing/2010/main">
+                <a:solidFill>
+                  <a:srgbClr val="FFFFFF"/>
+                </a:solidFill>
+              </a14:hiddenFill>
+            </a:ext>
+          </a:extLst>
+        </p:spPr>
+      </p:pic>
+      <p:sp>
+        <p:nvSpPr>
+          <p:cNvPr id="10" name="TextBox 9">
+            <a:extLst>
+              <a:ext uri="{FF2B5EF4-FFF2-40B4-BE49-F238E27FC236}">
+                <a16:creationId xmlns:a16="http://schemas.microsoft.com/office/drawing/2014/main" id="{CFD5810F-B20A-48C9-A99C-70D9AFF88D47}"/>
+              </a:ext>
+            </a:extLst>
+          </p:cNvPr>
+          <p:cNvSpPr txBox="1"/>
+          <p:nvPr/>
+        </p:nvSpPr>
+        <p:spPr>
+          <a:xfrm>
+            <a:off x="8395709" y="642387"/>
+            <a:ext cx="351607" cy="769441"/>
+          </a:xfrm>
+          <a:prstGeom prst="rect">
+            <a:avLst/>
+          </a:prstGeom>
+          <a:noFill/>
+        </p:spPr>
+        <p:txBody>
+          <a:bodyPr wrap="square">
+            <a:spAutoFit/>
+          </a:bodyPr>
+          <a:lstStyle/>
+          <a:p>
+            <a:r>
+              <a:rPr lang="ru-RU" sz="4400" dirty="0"/>
+              <a:t>+</a:t>
+            </a:r>
+          </a:p>
+        </p:txBody>
+      </p:sp>
     </p:spTree>
     <p:extLst>
       <p:ext uri="{BB962C8B-B14F-4D97-AF65-F5344CB8AC3E}">
@@ -4199,8 +4526,12 @@
           <a:lstStyle/>
           <a:p>
             <a:r>
+              <a:rPr lang="ru-RU" sz="7200" dirty="0"/>
+              <a:t>Спасибо за внимание</a:t>
+            </a:r>
+            <a:r>
               <a:rPr lang="ru-RU" dirty="0"/>
-              <a:t>Спасибо за внимание.</a:t>
+              <a:t>.</a:t>
             </a:r>
           </a:p>
         </p:txBody>

</xml_diff>

<commit_message>
pictures addition in presentation
</commit_message>
<xml_diff>
--- a/MegaPolls.pptx
+++ b/MegaPolls.pptx
@@ -10,8 +10,14 @@
     <p:sldId id="258" r:id="rId4"/>
     <p:sldId id="262" r:id="rId5"/>
     <p:sldId id="259" r:id="rId6"/>
-    <p:sldId id="260" r:id="rId7"/>
-    <p:sldId id="261" r:id="rId8"/>
+    <p:sldId id="263" r:id="rId7"/>
+    <p:sldId id="264" r:id="rId8"/>
+    <p:sldId id="265" r:id="rId9"/>
+    <p:sldId id="266" r:id="rId10"/>
+    <p:sldId id="267" r:id="rId11"/>
+    <p:sldId id="268" r:id="rId12"/>
+    <p:sldId id="260" r:id="rId13"/>
+    <p:sldId id="261" r:id="rId14"/>
   </p:sldIdLst>
   <p:sldSz cx="12192000" cy="6858000"/>
   <p:notesSz cx="6858000" cy="9144000"/>
@@ -265,7 +271,7 @@
           <a:p>
             <a:fld id="{5D8E3154-8C91-48A5-9F4B-471C0B6D395B}" type="datetimeFigureOut">
               <a:rPr lang="ru-RU" smtClean="0"/>
-              <a:t>24.04.2022</a:t>
+              <a:t>26.04.2022</a:t>
             </a:fld>
             <a:endParaRPr lang="ru-RU"/>
           </a:p>
@@ -463,7 +469,7 @@
           <a:p>
             <a:fld id="{5D8E3154-8C91-48A5-9F4B-471C0B6D395B}" type="datetimeFigureOut">
               <a:rPr lang="ru-RU" smtClean="0"/>
-              <a:t>24.04.2022</a:t>
+              <a:t>26.04.2022</a:t>
             </a:fld>
             <a:endParaRPr lang="ru-RU"/>
           </a:p>
@@ -671,7 +677,7 @@
           <a:p>
             <a:fld id="{5D8E3154-8C91-48A5-9F4B-471C0B6D395B}" type="datetimeFigureOut">
               <a:rPr lang="ru-RU" smtClean="0"/>
-              <a:t>24.04.2022</a:t>
+              <a:t>26.04.2022</a:t>
             </a:fld>
             <a:endParaRPr lang="ru-RU"/>
           </a:p>
@@ -869,7 +875,7 @@
           <a:p>
             <a:fld id="{5D8E3154-8C91-48A5-9F4B-471C0B6D395B}" type="datetimeFigureOut">
               <a:rPr lang="ru-RU" smtClean="0"/>
-              <a:t>24.04.2022</a:t>
+              <a:t>26.04.2022</a:t>
             </a:fld>
             <a:endParaRPr lang="ru-RU"/>
           </a:p>
@@ -1144,7 +1150,7 @@
           <a:p>
             <a:fld id="{5D8E3154-8C91-48A5-9F4B-471C0B6D395B}" type="datetimeFigureOut">
               <a:rPr lang="ru-RU" smtClean="0"/>
-              <a:t>24.04.2022</a:t>
+              <a:t>26.04.2022</a:t>
             </a:fld>
             <a:endParaRPr lang="ru-RU"/>
           </a:p>
@@ -1409,7 +1415,7 @@
           <a:p>
             <a:fld id="{5D8E3154-8C91-48A5-9F4B-471C0B6D395B}" type="datetimeFigureOut">
               <a:rPr lang="ru-RU" smtClean="0"/>
-              <a:t>24.04.2022</a:t>
+              <a:t>26.04.2022</a:t>
             </a:fld>
             <a:endParaRPr lang="ru-RU"/>
           </a:p>
@@ -1821,7 +1827,7 @@
           <a:p>
             <a:fld id="{5D8E3154-8C91-48A5-9F4B-471C0B6D395B}" type="datetimeFigureOut">
               <a:rPr lang="ru-RU" smtClean="0"/>
-              <a:t>24.04.2022</a:t>
+              <a:t>26.04.2022</a:t>
             </a:fld>
             <a:endParaRPr lang="ru-RU"/>
           </a:p>
@@ -1962,7 +1968,7 @@
           <a:p>
             <a:fld id="{5D8E3154-8C91-48A5-9F4B-471C0B6D395B}" type="datetimeFigureOut">
               <a:rPr lang="ru-RU" smtClean="0"/>
-              <a:t>24.04.2022</a:t>
+              <a:t>26.04.2022</a:t>
             </a:fld>
             <a:endParaRPr lang="ru-RU"/>
           </a:p>
@@ -2075,7 +2081,7 @@
           <a:p>
             <a:fld id="{5D8E3154-8C91-48A5-9F4B-471C0B6D395B}" type="datetimeFigureOut">
               <a:rPr lang="ru-RU" smtClean="0"/>
-              <a:t>24.04.2022</a:t>
+              <a:t>26.04.2022</a:t>
             </a:fld>
             <a:endParaRPr lang="ru-RU"/>
           </a:p>
@@ -2386,7 +2392,7 @@
           <a:p>
             <a:fld id="{5D8E3154-8C91-48A5-9F4B-471C0B6D395B}" type="datetimeFigureOut">
               <a:rPr lang="ru-RU" smtClean="0"/>
-              <a:t>24.04.2022</a:t>
+              <a:t>26.04.2022</a:t>
             </a:fld>
             <a:endParaRPr lang="ru-RU"/>
           </a:p>
@@ -2674,7 +2680,7 @@
           <a:p>
             <a:fld id="{5D8E3154-8C91-48A5-9F4B-471C0B6D395B}" type="datetimeFigureOut">
               <a:rPr lang="ru-RU" smtClean="0"/>
-              <a:t>24.04.2022</a:t>
+              <a:t>26.04.2022</a:t>
             </a:fld>
             <a:endParaRPr lang="ru-RU"/>
           </a:p>
@@ -2915,7 +2921,7 @@
           <a:p>
             <a:fld id="{5D8E3154-8C91-48A5-9F4B-471C0B6D395B}" type="datetimeFigureOut">
               <a:rPr lang="ru-RU" smtClean="0"/>
-              <a:t>24.04.2022</a:t>
+              <a:t>26.04.2022</a:t>
             </a:fld>
             <a:endParaRPr lang="ru-RU"/>
           </a:p>
@@ -3411,6 +3417,582 @@
 </p:sld>
 </file>
 
+<file path=ppt/slides/slide10.xml><?xml version="1.0" encoding="utf-8"?>
+<p:sld xmlns:a="http://schemas.openxmlformats.org/drawingml/2006/main" xmlns:r="http://schemas.openxmlformats.org/officeDocument/2006/relationships" xmlns:p="http://schemas.openxmlformats.org/presentationml/2006/main">
+  <p:cSld>
+    <p:spTree>
+      <p:nvGrpSpPr>
+        <p:cNvPr id="1" name=""/>
+        <p:cNvGrpSpPr/>
+        <p:nvPr/>
+      </p:nvGrpSpPr>
+      <p:grpSpPr>
+        <a:xfrm>
+          <a:off x="0" y="0"/>
+          <a:ext cx="0" cy="0"/>
+          <a:chOff x="0" y="0"/>
+          <a:chExt cx="0" cy="0"/>
+        </a:xfrm>
+      </p:grpSpPr>
+      <p:sp>
+        <p:nvSpPr>
+          <p:cNvPr id="2" name="Заголовок 1">
+            <a:extLst>
+              <a:ext uri="{FF2B5EF4-FFF2-40B4-BE49-F238E27FC236}">
+                <a16:creationId xmlns:a16="http://schemas.microsoft.com/office/drawing/2014/main" id="{FB28663E-AC86-40E0-B2E4-C16DFD9D080E}"/>
+              </a:ext>
+            </a:extLst>
+          </p:cNvPr>
+          <p:cNvSpPr>
+            <a:spLocks noGrp="1"/>
+          </p:cNvSpPr>
+          <p:nvPr>
+            <p:ph type="title"/>
+          </p:nvPr>
+        </p:nvSpPr>
+        <p:spPr/>
+        <p:txBody>
+          <a:bodyPr/>
+          <a:lstStyle/>
+          <a:p>
+            <a:r>
+              <a:rPr lang="ru-RU" dirty="0"/>
+              <a:t>Опросы</a:t>
+            </a:r>
+          </a:p>
+        </p:txBody>
+      </p:sp>
+      <p:pic>
+        <p:nvPicPr>
+          <p:cNvPr id="5" name="Объект 4">
+            <a:extLst>
+              <a:ext uri="{FF2B5EF4-FFF2-40B4-BE49-F238E27FC236}">
+                <a16:creationId xmlns:a16="http://schemas.microsoft.com/office/drawing/2014/main" id="{2297EC47-9B7A-4D82-993B-479F5C5B9007}"/>
+              </a:ext>
+            </a:extLst>
+          </p:cNvPr>
+          <p:cNvPicPr>
+            <a:picLocks noGrp="1" noChangeAspect="1"/>
+          </p:cNvPicPr>
+          <p:nvPr>
+            <p:ph idx="1"/>
+          </p:nvPr>
+        </p:nvPicPr>
+        <p:blipFill>
+          <a:blip r:embed="rId2"/>
+          <a:stretch>
+            <a:fillRect/>
+          </a:stretch>
+        </p:blipFill>
+        <p:spPr>
+          <a:xfrm>
+            <a:off x="2228144" y="1825625"/>
+            <a:ext cx="7735712" cy="4351338"/>
+          </a:xfrm>
+        </p:spPr>
+      </p:pic>
+    </p:spTree>
+    <p:extLst>
+      <p:ext uri="{BB962C8B-B14F-4D97-AF65-F5344CB8AC3E}">
+        <p14:creationId xmlns:p14="http://schemas.microsoft.com/office/powerpoint/2010/main" val="51442011"/>
+      </p:ext>
+    </p:extLst>
+  </p:cSld>
+  <p:clrMapOvr>
+    <a:masterClrMapping/>
+  </p:clrMapOvr>
+</p:sld>
+</file>
+
+<file path=ppt/slides/slide11.xml><?xml version="1.0" encoding="utf-8"?>
+<p:sld xmlns:a="http://schemas.openxmlformats.org/drawingml/2006/main" xmlns:r="http://schemas.openxmlformats.org/officeDocument/2006/relationships" xmlns:p="http://schemas.openxmlformats.org/presentationml/2006/main">
+  <p:cSld>
+    <p:spTree>
+      <p:nvGrpSpPr>
+        <p:cNvPr id="1" name=""/>
+        <p:cNvGrpSpPr/>
+        <p:nvPr/>
+      </p:nvGrpSpPr>
+      <p:grpSpPr>
+        <a:xfrm>
+          <a:off x="0" y="0"/>
+          <a:ext cx="0" cy="0"/>
+          <a:chOff x="0" y="0"/>
+          <a:chExt cx="0" cy="0"/>
+        </a:xfrm>
+      </p:grpSpPr>
+      <p:sp>
+        <p:nvSpPr>
+          <p:cNvPr id="2" name="Заголовок 1">
+            <a:extLst>
+              <a:ext uri="{FF2B5EF4-FFF2-40B4-BE49-F238E27FC236}">
+                <a16:creationId xmlns:a16="http://schemas.microsoft.com/office/drawing/2014/main" id="{54007116-C096-477E-85D9-38E2000C5E34}"/>
+              </a:ext>
+            </a:extLst>
+          </p:cNvPr>
+          <p:cNvSpPr>
+            <a:spLocks noGrp="1"/>
+          </p:cNvSpPr>
+          <p:nvPr>
+            <p:ph type="title"/>
+          </p:nvPr>
+        </p:nvSpPr>
+        <p:spPr/>
+        <p:txBody>
+          <a:bodyPr/>
+          <a:lstStyle/>
+          <a:p>
+            <a:r>
+              <a:rPr lang="ru-RU" dirty="0"/>
+              <a:t>Результат опроса(та же страница)</a:t>
+            </a:r>
+          </a:p>
+        </p:txBody>
+      </p:sp>
+      <p:pic>
+        <p:nvPicPr>
+          <p:cNvPr id="5" name="Объект 4">
+            <a:extLst>
+              <a:ext uri="{FF2B5EF4-FFF2-40B4-BE49-F238E27FC236}">
+                <a16:creationId xmlns:a16="http://schemas.microsoft.com/office/drawing/2014/main" id="{0BE7B8A4-3F03-4C84-B745-5F96821ACFA3}"/>
+              </a:ext>
+            </a:extLst>
+          </p:cNvPr>
+          <p:cNvPicPr>
+            <a:picLocks noGrp="1" noChangeAspect="1"/>
+          </p:cNvPicPr>
+          <p:nvPr>
+            <p:ph idx="1"/>
+          </p:nvPr>
+        </p:nvPicPr>
+        <p:blipFill>
+          <a:blip r:embed="rId2"/>
+          <a:stretch>
+            <a:fillRect/>
+          </a:stretch>
+        </p:blipFill>
+        <p:spPr>
+          <a:xfrm>
+            <a:off x="2228144" y="1825625"/>
+            <a:ext cx="7735712" cy="4351338"/>
+          </a:xfrm>
+        </p:spPr>
+      </p:pic>
+    </p:spTree>
+    <p:extLst>
+      <p:ext uri="{BB962C8B-B14F-4D97-AF65-F5344CB8AC3E}">
+        <p14:creationId xmlns:p14="http://schemas.microsoft.com/office/powerpoint/2010/main" val="4062477499"/>
+      </p:ext>
+    </p:extLst>
+  </p:cSld>
+  <p:clrMapOvr>
+    <a:masterClrMapping/>
+  </p:clrMapOvr>
+</p:sld>
+</file>
+
+<file path=ppt/slides/slide12.xml><?xml version="1.0" encoding="utf-8"?>
+<p:sld xmlns:a="http://schemas.openxmlformats.org/drawingml/2006/main" xmlns:r="http://schemas.openxmlformats.org/officeDocument/2006/relationships" xmlns:p="http://schemas.openxmlformats.org/presentationml/2006/main">
+  <p:cSld>
+    <p:spTree>
+      <p:nvGrpSpPr>
+        <p:cNvPr id="1" name=""/>
+        <p:cNvGrpSpPr/>
+        <p:nvPr/>
+      </p:nvGrpSpPr>
+      <p:grpSpPr>
+        <a:xfrm>
+          <a:off x="0" y="0"/>
+          <a:ext cx="0" cy="0"/>
+          <a:chOff x="0" y="0"/>
+          <a:chExt cx="0" cy="0"/>
+        </a:xfrm>
+      </p:grpSpPr>
+      <p:sp>
+        <p:nvSpPr>
+          <p:cNvPr id="2" name="Заголовок 1">
+            <a:extLst>
+              <a:ext uri="{FF2B5EF4-FFF2-40B4-BE49-F238E27FC236}">
+                <a16:creationId xmlns:a16="http://schemas.microsoft.com/office/drawing/2014/main" id="{E151291A-2CCB-4277-88EF-D91E93678A2F}"/>
+              </a:ext>
+            </a:extLst>
+          </p:cNvPr>
+          <p:cNvSpPr>
+            <a:spLocks noGrp="1"/>
+          </p:cNvSpPr>
+          <p:nvPr>
+            <p:ph type="title"/>
+          </p:nvPr>
+        </p:nvSpPr>
+        <p:spPr/>
+        <p:txBody>
+          <a:bodyPr/>
+          <a:lstStyle/>
+          <a:p>
+            <a:r>
+              <a:rPr lang="ru-RU" dirty="0"/>
+              <a:t>Дальнейшее развитие</a:t>
+            </a:r>
+          </a:p>
+        </p:txBody>
+      </p:sp>
+      <p:sp>
+        <p:nvSpPr>
+          <p:cNvPr id="3" name="Объект 2">
+            <a:extLst>
+              <a:ext uri="{FF2B5EF4-FFF2-40B4-BE49-F238E27FC236}">
+                <a16:creationId xmlns:a16="http://schemas.microsoft.com/office/drawing/2014/main" id="{24A5B8E2-6F4C-4D96-B0C5-F4CE875A3D3D}"/>
+              </a:ext>
+            </a:extLst>
+          </p:cNvPr>
+          <p:cNvSpPr>
+            <a:spLocks noGrp="1"/>
+          </p:cNvSpPr>
+          <p:nvPr>
+            <p:ph idx="1"/>
+          </p:nvPr>
+        </p:nvSpPr>
+        <p:spPr/>
+        <p:txBody>
+          <a:bodyPr/>
+          <a:lstStyle/>
+          <a:p>
+            <a:r>
+              <a:rPr lang="ru-RU" dirty="0"/>
+              <a:t>Код сайта находится в открытом доступе на </a:t>
+            </a:r>
+            <a:r>
+              <a:rPr lang="en-US" dirty="0" err="1"/>
+              <a:t>Github</a:t>
+            </a:r>
+            <a:r>
+              <a:rPr lang="ru-RU" dirty="0"/>
+              <a:t>, при каждом </a:t>
+            </a:r>
+            <a:r>
+              <a:rPr lang="ru-RU" dirty="0" err="1"/>
+              <a:t>пуше</a:t>
+            </a:r>
+            <a:r>
+              <a:rPr lang="ru-RU" dirty="0"/>
+              <a:t> в </a:t>
+            </a:r>
+            <a:r>
+              <a:rPr lang="en-US" dirty="0"/>
+              <a:t>main </a:t>
+            </a:r>
+            <a:r>
+              <a:rPr lang="ru-RU" dirty="0"/>
+              <a:t>создается </a:t>
+            </a:r>
+            <a:r>
+              <a:rPr lang="en-US" dirty="0"/>
+              <a:t>.exe </a:t>
+            </a:r>
+            <a:r>
+              <a:rPr lang="ru-RU" dirty="0" err="1"/>
+              <a:t>билд</a:t>
+            </a:r>
+            <a:r>
+              <a:rPr lang="en-US" dirty="0"/>
+              <a:t>(</a:t>
+            </a:r>
+            <a:r>
+              <a:rPr lang="ru-RU" dirty="0"/>
+              <a:t>который вы можете скачать, положить в папку и запустить сайт на своем ПК) и сайт автоматически публикуется на </a:t>
+            </a:r>
+            <a:r>
+              <a:rPr lang="en-US" dirty="0"/>
+              <a:t>Heroku.</a:t>
+            </a:r>
+            <a:r>
+              <a:rPr lang="ru-RU" dirty="0"/>
+              <a:t> Если есть желание – можете </a:t>
+            </a:r>
+            <a:r>
+              <a:rPr lang="ru-RU" dirty="0" err="1"/>
+              <a:t>форкаться</a:t>
+            </a:r>
+            <a:r>
+              <a:rPr lang="ru-RU" dirty="0"/>
+              <a:t> и пробовать вносить свои изменения, все </a:t>
+            </a:r>
+            <a:r>
+              <a:rPr lang="en-US" dirty="0"/>
+              <a:t>PR </a:t>
+            </a:r>
+            <a:r>
+              <a:rPr lang="ru-RU" dirty="0"/>
+              <a:t>будут рассмотрены.</a:t>
+            </a:r>
+          </a:p>
+          <a:p>
+            <a:r>
+              <a:rPr lang="ru-RU" dirty="0"/>
+              <a:t>В главном </a:t>
+            </a:r>
+            <a:r>
+              <a:rPr lang="en-US" dirty="0"/>
+              <a:t>Python </a:t>
+            </a:r>
+            <a:r>
+              <a:rPr lang="ru-RU" dirty="0"/>
+              <a:t>файле я ко всем строкам написал комментарии, так что с понятием кода проблем возникать не должно.</a:t>
+            </a:r>
+          </a:p>
+          <a:p>
+            <a:r>
+              <a:rPr lang="ru-RU" dirty="0"/>
+              <a:t> В будущем планирую сделать мобильное приложение</a:t>
+            </a:r>
+            <a:r>
+              <a:rPr lang="en-US" dirty="0"/>
+              <a:t>(</a:t>
+            </a:r>
+            <a:r>
+              <a:rPr lang="ru-RU" dirty="0"/>
+              <a:t>на </a:t>
+            </a:r>
+            <a:r>
+              <a:rPr lang="en-US" dirty="0"/>
+              <a:t>Flutter)</a:t>
+            </a:r>
+            <a:r>
+              <a:rPr lang="ru-RU" dirty="0"/>
+              <a:t> под сайт, так что проект скорее всего будет развиваться.</a:t>
+            </a:r>
+          </a:p>
+        </p:txBody>
+      </p:sp>
+      <p:pic>
+        <p:nvPicPr>
+          <p:cNvPr id="1032" name="Picture 8" descr="Логотип github – Бесплатные иконки: социальные медиа">
+            <a:extLst>
+              <a:ext uri="{FF2B5EF4-FFF2-40B4-BE49-F238E27FC236}">
+                <a16:creationId xmlns:a16="http://schemas.microsoft.com/office/drawing/2014/main" id="{571C56E4-B5EB-4EC2-93FB-87A73CA478CE}"/>
+              </a:ext>
+            </a:extLst>
+          </p:cNvPr>
+          <p:cNvPicPr>
+            <a:picLocks noChangeAspect="1" noChangeArrowheads="1"/>
+          </p:cNvPicPr>
+          <p:nvPr/>
+        </p:nvPicPr>
+        <p:blipFill>
+          <a:blip r:embed="rId2">
+            <a:extLst>
+              <a:ext uri="{28A0092B-C50C-407E-A947-70E740481C1C}">
+                <a14:useLocalDpi xmlns:a14="http://schemas.microsoft.com/office/drawing/2010/main" val="0"/>
+              </a:ext>
+            </a:extLst>
+          </a:blip>
+          <a:srcRect/>
+          <a:stretch>
+            <a:fillRect/>
+          </a:stretch>
+        </p:blipFill>
+        <p:spPr bwMode="auto">
+          <a:xfrm>
+            <a:off x="6695689" y="305855"/>
+            <a:ext cx="1442508" cy="1442508"/>
+          </a:xfrm>
+          <a:prstGeom prst="rect">
+            <a:avLst/>
+          </a:prstGeom>
+          <a:noFill/>
+          <a:extLst>
+            <a:ext uri="{909E8E84-426E-40DD-AFC4-6F175D3DCCD1}">
+              <a14:hiddenFill xmlns:a14="http://schemas.microsoft.com/office/drawing/2010/main">
+                <a:solidFill>
+                  <a:srgbClr val="FFFFFF"/>
+                </a:solidFill>
+              </a14:hiddenFill>
+            </a:ext>
+          </a:extLst>
+        </p:spPr>
+      </p:pic>
+      <p:pic>
+        <p:nvPicPr>
+          <p:cNvPr id="1034" name="Picture 10" descr="File, type, flutter Free Icon - Icon-Icons.com">
+            <a:extLst>
+              <a:ext uri="{FF2B5EF4-FFF2-40B4-BE49-F238E27FC236}">
+                <a16:creationId xmlns:a16="http://schemas.microsoft.com/office/drawing/2014/main" id="{F706AAD2-5E5B-4BB7-B4E4-A138CB3D8997}"/>
+              </a:ext>
+            </a:extLst>
+          </p:cNvPr>
+          <p:cNvPicPr>
+            <a:picLocks noChangeAspect="1" noChangeArrowheads="1"/>
+          </p:cNvPicPr>
+          <p:nvPr/>
+        </p:nvPicPr>
+        <p:blipFill>
+          <a:blip r:embed="rId3">
+            <a:extLst>
+              <a:ext uri="{28A0092B-C50C-407E-A947-70E740481C1C}">
+                <a14:useLocalDpi xmlns:a14="http://schemas.microsoft.com/office/drawing/2010/main" val="0"/>
+              </a:ext>
+            </a:extLst>
+          </a:blip>
+          <a:srcRect/>
+          <a:stretch>
+            <a:fillRect/>
+          </a:stretch>
+        </p:blipFill>
+        <p:spPr bwMode="auto">
+          <a:xfrm>
+            <a:off x="9004829" y="400575"/>
+            <a:ext cx="1253067" cy="1253067"/>
+          </a:xfrm>
+          <a:prstGeom prst="rect">
+            <a:avLst/>
+          </a:prstGeom>
+          <a:noFill/>
+          <a:extLst>
+            <a:ext uri="{909E8E84-426E-40DD-AFC4-6F175D3DCCD1}">
+              <a14:hiddenFill xmlns:a14="http://schemas.microsoft.com/office/drawing/2010/main">
+                <a:solidFill>
+                  <a:srgbClr val="FFFFFF"/>
+                </a:solidFill>
+              </a14:hiddenFill>
+            </a:ext>
+          </a:extLst>
+        </p:spPr>
+      </p:pic>
+      <p:sp>
+        <p:nvSpPr>
+          <p:cNvPr id="10" name="TextBox 9">
+            <a:extLst>
+              <a:ext uri="{FF2B5EF4-FFF2-40B4-BE49-F238E27FC236}">
+                <a16:creationId xmlns:a16="http://schemas.microsoft.com/office/drawing/2014/main" id="{CFD5810F-B20A-48C9-A99C-70D9AFF88D47}"/>
+              </a:ext>
+            </a:extLst>
+          </p:cNvPr>
+          <p:cNvSpPr txBox="1"/>
+          <p:nvPr/>
+        </p:nvSpPr>
+        <p:spPr>
+          <a:xfrm>
+            <a:off x="8395709" y="642387"/>
+            <a:ext cx="351607" cy="769441"/>
+          </a:xfrm>
+          <a:prstGeom prst="rect">
+            <a:avLst/>
+          </a:prstGeom>
+          <a:noFill/>
+        </p:spPr>
+        <p:txBody>
+          <a:bodyPr wrap="square">
+            <a:spAutoFit/>
+          </a:bodyPr>
+          <a:lstStyle/>
+          <a:p>
+            <a:r>
+              <a:rPr lang="ru-RU" sz="4400" dirty="0"/>
+              <a:t>+</a:t>
+            </a:r>
+          </a:p>
+        </p:txBody>
+      </p:sp>
+    </p:spTree>
+    <p:extLst>
+      <p:ext uri="{BB962C8B-B14F-4D97-AF65-F5344CB8AC3E}">
+        <p14:creationId xmlns:p14="http://schemas.microsoft.com/office/powerpoint/2010/main" val="2589031634"/>
+      </p:ext>
+    </p:extLst>
+  </p:cSld>
+  <p:clrMapOvr>
+    <a:masterClrMapping/>
+  </p:clrMapOvr>
+</p:sld>
+</file>
+
+<file path=ppt/slides/slide13.xml><?xml version="1.0" encoding="utf-8"?>
+<p:sld xmlns:a="http://schemas.openxmlformats.org/drawingml/2006/main" xmlns:r="http://schemas.openxmlformats.org/officeDocument/2006/relationships" xmlns:p="http://schemas.openxmlformats.org/presentationml/2006/main">
+  <p:cSld>
+    <p:spTree>
+      <p:nvGrpSpPr>
+        <p:cNvPr id="1" name=""/>
+        <p:cNvGrpSpPr/>
+        <p:nvPr/>
+      </p:nvGrpSpPr>
+      <p:grpSpPr>
+        <a:xfrm>
+          <a:off x="0" y="0"/>
+          <a:ext cx="0" cy="0"/>
+          <a:chOff x="0" y="0"/>
+          <a:chExt cx="0" cy="0"/>
+        </a:xfrm>
+      </p:grpSpPr>
+      <p:sp>
+        <p:nvSpPr>
+          <p:cNvPr id="2" name="Заголовок 1">
+            <a:extLst>
+              <a:ext uri="{FF2B5EF4-FFF2-40B4-BE49-F238E27FC236}">
+                <a16:creationId xmlns:a16="http://schemas.microsoft.com/office/drawing/2014/main" id="{7173C511-3F27-44C1-9E5F-BB7C089E811D}"/>
+              </a:ext>
+            </a:extLst>
+          </p:cNvPr>
+          <p:cNvSpPr>
+            <a:spLocks noGrp="1"/>
+          </p:cNvSpPr>
+          <p:nvPr>
+            <p:ph type="ctrTitle"/>
+          </p:nvPr>
+        </p:nvSpPr>
+        <p:spPr/>
+        <p:txBody>
+          <a:bodyPr/>
+          <a:lstStyle/>
+          <a:p>
+            <a:r>
+              <a:rPr lang="ru-RU" sz="7200" dirty="0"/>
+              <a:t>Спасибо за внимание</a:t>
+            </a:r>
+            <a:r>
+              <a:rPr lang="ru-RU" dirty="0"/>
+              <a:t>.</a:t>
+            </a:r>
+          </a:p>
+        </p:txBody>
+      </p:sp>
+      <p:sp>
+        <p:nvSpPr>
+          <p:cNvPr id="3" name="Подзаголовок 2">
+            <a:extLst>
+              <a:ext uri="{FF2B5EF4-FFF2-40B4-BE49-F238E27FC236}">
+                <a16:creationId xmlns:a16="http://schemas.microsoft.com/office/drawing/2014/main" id="{3EA106BD-F37C-4964-B72A-36F83243772D}"/>
+              </a:ext>
+            </a:extLst>
+          </p:cNvPr>
+          <p:cNvSpPr>
+            <a:spLocks noGrp="1"/>
+          </p:cNvSpPr>
+          <p:nvPr>
+            <p:ph type="subTitle" idx="1"/>
+          </p:nvPr>
+        </p:nvSpPr>
+        <p:spPr/>
+        <p:txBody>
+          <a:bodyPr/>
+          <a:lstStyle/>
+          <a:p>
+            <a:endParaRPr lang="ru-RU"/>
+          </a:p>
+        </p:txBody>
+      </p:sp>
+    </p:spTree>
+    <p:extLst>
+      <p:ext uri="{BB962C8B-B14F-4D97-AF65-F5344CB8AC3E}">
+        <p14:creationId xmlns:p14="http://schemas.microsoft.com/office/powerpoint/2010/main" val="443505665"/>
+      </p:ext>
+    </p:extLst>
+  </p:cSld>
+  <p:clrMapOvr>
+    <a:masterClrMapping/>
+  </p:clrMapOvr>
+</p:sld>
+</file>
+
 <file path=ppt/slides/slide2.xml><?xml version="1.0" encoding="utf-8"?>
 <p:sld xmlns:a="http://schemas.openxmlformats.org/drawingml/2006/main" xmlns:r="http://schemas.openxmlformats.org/officeDocument/2006/relationships" xmlns:p="http://schemas.openxmlformats.org/presentationml/2006/main">
   <p:cSld>
@@ -4021,26 +4603,9 @@
         <p:spPr/>
         <p:txBody>
           <a:bodyPr>
-            <a:normAutofit lnSpcReduction="10000"/>
+            <a:normAutofit/>
           </a:bodyPr>
           <a:lstStyle/>
-          <a:p>
-            <a:pPr marL="0" indent="0">
-              <a:buNone/>
-            </a:pPr>
-            <a:r>
-              <a:rPr lang="ru-RU" dirty="0"/>
-              <a:t>Не считаю, что нужно вставлять какие-либо картинки, ибо вы сами можете посмотреть что нужно</a:t>
-            </a:r>
-            <a:r>
-              <a:rPr lang="en-US" dirty="0"/>
-              <a:t> (</a:t>
-            </a:r>
-            <a:r>
-              <a:rPr lang="ru-RU" dirty="0"/>
-              <a:t>и еще потыкать на кнопочки) просто введя ссылку в браузер.</a:t>
-            </a:r>
-          </a:p>
           <a:p>
             <a:r>
               <a:rPr lang="ru-RU" dirty="0"/>
@@ -4194,7 +4759,7 @@
           <p:cNvPr id="2" name="Заголовок 1">
             <a:extLst>
               <a:ext uri="{FF2B5EF4-FFF2-40B4-BE49-F238E27FC236}">
-                <a16:creationId xmlns:a16="http://schemas.microsoft.com/office/drawing/2014/main" id="{E151291A-2CCB-4277-88EF-D91E93678A2F}"/>
+                <a16:creationId xmlns:a16="http://schemas.microsoft.com/office/drawing/2014/main" id="{2A802C6F-53FF-451B-A02A-5A722758DE1E}"/>
               </a:ext>
             </a:extLst>
           </p:cNvPr>
@@ -4212,7 +4777,7 @@
           <a:p>
             <a:r>
               <a:rPr lang="ru-RU" dirty="0"/>
-              <a:t>Дальнейшее развитие</a:t>
+              <a:t>Главная страница</a:t>
             </a:r>
           </a:p>
         </p:txBody>
@@ -4222,7 +4787,7 @@
           <p:cNvPr id="3" name="Объект 2">
             <a:extLst>
               <a:ext uri="{FF2B5EF4-FFF2-40B4-BE49-F238E27FC236}">
-                <a16:creationId xmlns:a16="http://schemas.microsoft.com/office/drawing/2014/main" id="{24A5B8E2-6F4C-4D96-B0C5-F4CE875A3D3D}"/>
+                <a16:creationId xmlns:a16="http://schemas.microsoft.com/office/drawing/2014/main" id="{2C235547-8659-4B58-8072-03497A512D9E}"/>
               </a:ext>
             </a:extLst>
           </p:cNvPr>
@@ -4238,246 +4803,44 @@
           <a:bodyPr/>
           <a:lstStyle/>
           <a:p>
-            <a:r>
-              <a:rPr lang="ru-RU" dirty="0"/>
-              <a:t>Код сайта находится в открытом доступе на </a:t>
-            </a:r>
-            <a:r>
-              <a:rPr lang="en-US" dirty="0" err="1"/>
-              <a:t>Github</a:t>
-            </a:r>
-            <a:r>
-              <a:rPr lang="ru-RU" dirty="0"/>
-              <a:t>, при каждом </a:t>
-            </a:r>
-            <a:r>
-              <a:rPr lang="ru-RU" dirty="0" err="1"/>
-              <a:t>пуше</a:t>
-            </a:r>
-            <a:r>
-              <a:rPr lang="ru-RU" dirty="0"/>
-              <a:t> в </a:t>
-            </a:r>
-            <a:r>
-              <a:rPr lang="en-US" dirty="0"/>
-              <a:t>main </a:t>
-            </a:r>
-            <a:r>
-              <a:rPr lang="ru-RU" dirty="0"/>
-              <a:t>создается </a:t>
-            </a:r>
-            <a:r>
-              <a:rPr lang="en-US" dirty="0"/>
-              <a:t>.exe </a:t>
-            </a:r>
-            <a:r>
-              <a:rPr lang="ru-RU" dirty="0" err="1"/>
-              <a:t>билд</a:t>
-            </a:r>
-            <a:r>
-              <a:rPr lang="en-US" dirty="0"/>
-              <a:t>(</a:t>
-            </a:r>
-            <a:r>
-              <a:rPr lang="ru-RU" dirty="0"/>
-              <a:t>который вы можете скачать, положить в папку и запустить сайт на своем ПК) и сайт автоматически публикуется на </a:t>
-            </a:r>
-            <a:r>
-              <a:rPr lang="en-US" dirty="0"/>
-              <a:t>Heroku.</a:t>
-            </a:r>
-            <a:r>
-              <a:rPr lang="ru-RU" dirty="0"/>
-              <a:t> Если есть желание – можете </a:t>
-            </a:r>
-            <a:r>
-              <a:rPr lang="ru-RU" dirty="0" err="1"/>
-              <a:t>форкаться</a:t>
-            </a:r>
-            <a:r>
-              <a:rPr lang="ru-RU" dirty="0"/>
-              <a:t> и пробовать вносить свои изменения, все </a:t>
-            </a:r>
-            <a:r>
-              <a:rPr lang="en-US" dirty="0"/>
-              <a:t>PR </a:t>
-            </a:r>
-            <a:r>
-              <a:rPr lang="ru-RU" dirty="0"/>
-              <a:t>будут рассмотрены.</a:t>
-            </a:r>
-          </a:p>
-          <a:p>
-            <a:r>
-              <a:rPr lang="ru-RU" dirty="0"/>
-              <a:t>В главном </a:t>
-            </a:r>
-            <a:r>
-              <a:rPr lang="en-US" dirty="0"/>
-              <a:t>Python </a:t>
-            </a:r>
-            <a:r>
-              <a:rPr lang="ru-RU" dirty="0"/>
-              <a:t>файле я ко всем строкам написал комментарии, так что с понятием кода проблем возникать не должно.</a:t>
-            </a:r>
-          </a:p>
-          <a:p>
-            <a:r>
-              <a:rPr lang="ru-RU" dirty="0"/>
-              <a:t> В будущем планирую сделать мобильное приложение</a:t>
-            </a:r>
-            <a:r>
-              <a:rPr lang="en-US" dirty="0"/>
-              <a:t>(</a:t>
-            </a:r>
-            <a:r>
-              <a:rPr lang="ru-RU" dirty="0"/>
-              <a:t>на </a:t>
-            </a:r>
-            <a:r>
-              <a:rPr lang="en-US" dirty="0"/>
-              <a:t>Flutter)</a:t>
-            </a:r>
-            <a:r>
-              <a:rPr lang="ru-RU" dirty="0"/>
-              <a:t> под сайт, так что проект скорее всего будет развиваться.</a:t>
-            </a:r>
+            <a:endParaRPr lang="ru-RU"/>
           </a:p>
         </p:txBody>
       </p:sp>
       <p:pic>
         <p:nvPicPr>
-          <p:cNvPr id="1032" name="Picture 8" descr="Логотип github – Бесплатные иконки: социальные медиа">
-            <a:extLst>
-              <a:ext uri="{FF2B5EF4-FFF2-40B4-BE49-F238E27FC236}">
-                <a16:creationId xmlns:a16="http://schemas.microsoft.com/office/drawing/2014/main" id="{571C56E4-B5EB-4EC2-93FB-87A73CA478CE}"/>
+          <p:cNvPr id="7" name="Рисунок 6">
+            <a:extLst>
+              <a:ext uri="{FF2B5EF4-FFF2-40B4-BE49-F238E27FC236}">
+                <a16:creationId xmlns:a16="http://schemas.microsoft.com/office/drawing/2014/main" id="{9DAFFF02-E0CE-462B-8130-6D844BAACC6F}"/>
               </a:ext>
             </a:extLst>
           </p:cNvPr>
           <p:cNvPicPr>
-            <a:picLocks noChangeAspect="1" noChangeArrowheads="1"/>
+            <a:picLocks noChangeAspect="1"/>
           </p:cNvPicPr>
           <p:nvPr/>
         </p:nvPicPr>
         <p:blipFill>
-          <a:blip r:embed="rId2">
-            <a:extLst>
-              <a:ext uri="{28A0092B-C50C-407E-A947-70E740481C1C}">
-                <a14:useLocalDpi xmlns:a14="http://schemas.microsoft.com/office/drawing/2010/main" val="0"/>
-              </a:ext>
-            </a:extLst>
-          </a:blip>
-          <a:srcRect/>
+          <a:blip r:embed="rId2"/>
           <a:stretch>
             <a:fillRect/>
           </a:stretch>
         </p:blipFill>
-        <p:spPr bwMode="auto">
+        <p:spPr>
           <a:xfrm>
-            <a:off x="6695689" y="305855"/>
-            <a:ext cx="1442508" cy="1442508"/>
+            <a:off x="1922638" y="1653778"/>
+            <a:ext cx="8346723" cy="4695032"/>
           </a:xfrm>
           <a:prstGeom prst="rect">
             <a:avLst/>
           </a:prstGeom>
-          <a:noFill/>
-          <a:extLst>
-            <a:ext uri="{909E8E84-426E-40DD-AFC4-6F175D3DCCD1}">
-              <a14:hiddenFill xmlns:a14="http://schemas.microsoft.com/office/drawing/2010/main">
-                <a:solidFill>
-                  <a:srgbClr val="FFFFFF"/>
-                </a:solidFill>
-              </a14:hiddenFill>
-            </a:ext>
-          </a:extLst>
         </p:spPr>
       </p:pic>
-      <p:pic>
-        <p:nvPicPr>
-          <p:cNvPr id="1034" name="Picture 10" descr="File, type, flutter Free Icon - Icon-Icons.com">
-            <a:extLst>
-              <a:ext uri="{FF2B5EF4-FFF2-40B4-BE49-F238E27FC236}">
-                <a16:creationId xmlns:a16="http://schemas.microsoft.com/office/drawing/2014/main" id="{F706AAD2-5E5B-4BB7-B4E4-A138CB3D8997}"/>
-              </a:ext>
-            </a:extLst>
-          </p:cNvPr>
-          <p:cNvPicPr>
-            <a:picLocks noChangeAspect="1" noChangeArrowheads="1"/>
-          </p:cNvPicPr>
-          <p:nvPr/>
-        </p:nvPicPr>
-        <p:blipFill>
-          <a:blip r:embed="rId3">
-            <a:extLst>
-              <a:ext uri="{28A0092B-C50C-407E-A947-70E740481C1C}">
-                <a14:useLocalDpi xmlns:a14="http://schemas.microsoft.com/office/drawing/2010/main" val="0"/>
-              </a:ext>
-            </a:extLst>
-          </a:blip>
-          <a:srcRect/>
-          <a:stretch>
-            <a:fillRect/>
-          </a:stretch>
-        </p:blipFill>
-        <p:spPr bwMode="auto">
-          <a:xfrm>
-            <a:off x="9004829" y="400575"/>
-            <a:ext cx="1253067" cy="1253067"/>
-          </a:xfrm>
-          <a:prstGeom prst="rect">
-            <a:avLst/>
-          </a:prstGeom>
-          <a:noFill/>
-          <a:extLst>
-            <a:ext uri="{909E8E84-426E-40DD-AFC4-6F175D3DCCD1}">
-              <a14:hiddenFill xmlns:a14="http://schemas.microsoft.com/office/drawing/2010/main">
-                <a:solidFill>
-                  <a:srgbClr val="FFFFFF"/>
-                </a:solidFill>
-              </a14:hiddenFill>
-            </a:ext>
-          </a:extLst>
-        </p:spPr>
-      </p:pic>
-      <p:sp>
-        <p:nvSpPr>
-          <p:cNvPr id="10" name="TextBox 9">
-            <a:extLst>
-              <a:ext uri="{FF2B5EF4-FFF2-40B4-BE49-F238E27FC236}">
-                <a16:creationId xmlns:a16="http://schemas.microsoft.com/office/drawing/2014/main" id="{CFD5810F-B20A-48C9-A99C-70D9AFF88D47}"/>
-              </a:ext>
-            </a:extLst>
-          </p:cNvPr>
-          <p:cNvSpPr txBox="1"/>
-          <p:nvPr/>
-        </p:nvSpPr>
-        <p:spPr>
-          <a:xfrm>
-            <a:off x="8395709" y="642387"/>
-            <a:ext cx="351607" cy="769441"/>
-          </a:xfrm>
-          <a:prstGeom prst="rect">
-            <a:avLst/>
-          </a:prstGeom>
-          <a:noFill/>
-        </p:spPr>
-        <p:txBody>
-          <a:bodyPr wrap="square">
-            <a:spAutoFit/>
-          </a:bodyPr>
-          <a:lstStyle/>
-          <a:p>
-            <a:r>
-              <a:rPr lang="ru-RU" sz="4400" dirty="0"/>
-              <a:t>+</a:t>
-            </a:r>
-          </a:p>
-        </p:txBody>
-      </p:sp>
     </p:spTree>
     <p:extLst>
       <p:ext uri="{BB962C8B-B14F-4D97-AF65-F5344CB8AC3E}">
-        <p14:creationId xmlns:p14="http://schemas.microsoft.com/office/powerpoint/2010/main" val="2589031634"/>
+        <p14:creationId xmlns:p14="http://schemas.microsoft.com/office/powerpoint/2010/main" val="1070716614"/>
       </p:ext>
     </p:extLst>
   </p:cSld>
@@ -4509,62 +4872,237 @@
           <p:cNvPr id="2" name="Заголовок 1">
             <a:extLst>
               <a:ext uri="{FF2B5EF4-FFF2-40B4-BE49-F238E27FC236}">
-                <a16:creationId xmlns:a16="http://schemas.microsoft.com/office/drawing/2014/main" id="{7173C511-3F27-44C1-9E5F-BB7C089E811D}"/>
-              </a:ext>
-            </a:extLst>
-          </p:cNvPr>
-          <p:cNvSpPr>
-            <a:spLocks noGrp="1"/>
-          </p:cNvSpPr>
-          <p:nvPr>
-            <p:ph type="ctrTitle"/>
-          </p:nvPr>
-        </p:nvSpPr>
-        <p:spPr/>
-        <p:txBody>
-          <a:bodyPr/>
-          <a:lstStyle/>
-          <a:p>
-            <a:r>
-              <a:rPr lang="ru-RU" sz="7200" dirty="0"/>
-              <a:t>Спасибо за внимание</a:t>
-            </a:r>
+                <a16:creationId xmlns:a16="http://schemas.microsoft.com/office/drawing/2014/main" id="{6148B7B2-ECA5-4702-BA40-817D26C761EA}"/>
+              </a:ext>
+            </a:extLst>
+          </p:cNvPr>
+          <p:cNvSpPr>
+            <a:spLocks noGrp="1"/>
+          </p:cNvSpPr>
+          <p:nvPr>
+            <p:ph type="title"/>
+          </p:nvPr>
+        </p:nvSpPr>
+        <p:spPr/>
+        <p:txBody>
+          <a:bodyPr/>
+          <a:lstStyle/>
+          <a:p>
             <a:r>
               <a:rPr lang="ru-RU" dirty="0"/>
-              <a:t>.</a:t>
-            </a:r>
-          </a:p>
-        </p:txBody>
-      </p:sp>
-      <p:sp>
-        <p:nvSpPr>
-          <p:cNvPr id="3" name="Подзаголовок 2">
-            <a:extLst>
-              <a:ext uri="{FF2B5EF4-FFF2-40B4-BE49-F238E27FC236}">
-                <a16:creationId xmlns:a16="http://schemas.microsoft.com/office/drawing/2014/main" id="{3EA106BD-F37C-4964-B72A-36F83243772D}"/>
-              </a:ext>
-            </a:extLst>
-          </p:cNvPr>
-          <p:cNvSpPr>
-            <a:spLocks noGrp="1"/>
-          </p:cNvSpPr>
-          <p:nvPr>
-            <p:ph type="subTitle" idx="1"/>
-          </p:nvPr>
-        </p:nvSpPr>
-        <p:spPr/>
-        <p:txBody>
-          <a:bodyPr/>
-          <a:lstStyle/>
-          <a:p>
-            <a:endParaRPr lang="ru-RU"/>
-          </a:p>
-        </p:txBody>
-      </p:sp>
+              <a:t>Создание аккаунта</a:t>
+            </a:r>
+          </a:p>
+        </p:txBody>
+      </p:sp>
+      <p:pic>
+        <p:nvPicPr>
+          <p:cNvPr id="5" name="Объект 4">
+            <a:extLst>
+              <a:ext uri="{FF2B5EF4-FFF2-40B4-BE49-F238E27FC236}">
+                <a16:creationId xmlns:a16="http://schemas.microsoft.com/office/drawing/2014/main" id="{9F35D1F2-F024-4C44-8D45-C3969368A5B2}"/>
+              </a:ext>
+            </a:extLst>
+          </p:cNvPr>
+          <p:cNvPicPr>
+            <a:picLocks noGrp="1" noChangeAspect="1"/>
+          </p:cNvPicPr>
+          <p:nvPr>
+            <p:ph idx="1"/>
+          </p:nvPr>
+        </p:nvPicPr>
+        <p:blipFill>
+          <a:blip r:embed="rId2"/>
+          <a:stretch>
+            <a:fillRect/>
+          </a:stretch>
+        </p:blipFill>
+        <p:spPr>
+          <a:xfrm>
+            <a:off x="2228144" y="1825625"/>
+            <a:ext cx="7735712" cy="4351338"/>
+          </a:xfrm>
+        </p:spPr>
+      </p:pic>
     </p:spTree>
     <p:extLst>
       <p:ext uri="{BB962C8B-B14F-4D97-AF65-F5344CB8AC3E}">
-        <p14:creationId xmlns:p14="http://schemas.microsoft.com/office/powerpoint/2010/main" val="443505665"/>
+        <p14:creationId xmlns:p14="http://schemas.microsoft.com/office/powerpoint/2010/main" val="764457608"/>
+      </p:ext>
+    </p:extLst>
+  </p:cSld>
+  <p:clrMapOvr>
+    <a:masterClrMapping/>
+  </p:clrMapOvr>
+</p:sld>
+</file>
+
+<file path=ppt/slides/slide8.xml><?xml version="1.0" encoding="utf-8"?>
+<p:sld xmlns:a="http://schemas.openxmlformats.org/drawingml/2006/main" xmlns:r="http://schemas.openxmlformats.org/officeDocument/2006/relationships" xmlns:p="http://schemas.openxmlformats.org/presentationml/2006/main">
+  <p:cSld>
+    <p:spTree>
+      <p:nvGrpSpPr>
+        <p:cNvPr id="1" name=""/>
+        <p:cNvGrpSpPr/>
+        <p:nvPr/>
+      </p:nvGrpSpPr>
+      <p:grpSpPr>
+        <a:xfrm>
+          <a:off x="0" y="0"/>
+          <a:ext cx="0" cy="0"/>
+          <a:chOff x="0" y="0"/>
+          <a:chExt cx="0" cy="0"/>
+        </a:xfrm>
+      </p:grpSpPr>
+      <p:sp>
+        <p:nvSpPr>
+          <p:cNvPr id="2" name="Заголовок 1">
+            <a:extLst>
+              <a:ext uri="{FF2B5EF4-FFF2-40B4-BE49-F238E27FC236}">
+                <a16:creationId xmlns:a16="http://schemas.microsoft.com/office/drawing/2014/main" id="{B3A2185E-4B91-40CA-84F9-8CE8072DFC77}"/>
+              </a:ext>
+            </a:extLst>
+          </p:cNvPr>
+          <p:cNvSpPr>
+            <a:spLocks noGrp="1"/>
+          </p:cNvSpPr>
+          <p:nvPr>
+            <p:ph type="title"/>
+          </p:nvPr>
+        </p:nvSpPr>
+        <p:spPr/>
+        <p:txBody>
+          <a:bodyPr/>
+          <a:lstStyle/>
+          <a:p>
+            <a:r>
+              <a:rPr lang="ru-RU" dirty="0" err="1"/>
+              <a:t>Аккакунт</a:t>
+            </a:r>
+            <a:endParaRPr lang="ru-RU" dirty="0"/>
+          </a:p>
+        </p:txBody>
+      </p:sp>
+      <p:pic>
+        <p:nvPicPr>
+          <p:cNvPr id="5" name="Объект 4">
+            <a:extLst>
+              <a:ext uri="{FF2B5EF4-FFF2-40B4-BE49-F238E27FC236}">
+                <a16:creationId xmlns:a16="http://schemas.microsoft.com/office/drawing/2014/main" id="{85DD8EA7-2719-48C0-8F76-EAA7100B8FAD}"/>
+              </a:ext>
+            </a:extLst>
+          </p:cNvPr>
+          <p:cNvPicPr>
+            <a:picLocks noGrp="1" noChangeAspect="1"/>
+          </p:cNvPicPr>
+          <p:nvPr>
+            <p:ph idx="1"/>
+          </p:nvPr>
+        </p:nvPicPr>
+        <p:blipFill>
+          <a:blip r:embed="rId2"/>
+          <a:stretch>
+            <a:fillRect/>
+          </a:stretch>
+        </p:blipFill>
+        <p:spPr>
+          <a:xfrm>
+            <a:off x="2228144" y="1825625"/>
+            <a:ext cx="7735712" cy="4351338"/>
+          </a:xfrm>
+        </p:spPr>
+      </p:pic>
+    </p:spTree>
+    <p:extLst>
+      <p:ext uri="{BB962C8B-B14F-4D97-AF65-F5344CB8AC3E}">
+        <p14:creationId xmlns:p14="http://schemas.microsoft.com/office/powerpoint/2010/main" val="4078904956"/>
+      </p:ext>
+    </p:extLst>
+  </p:cSld>
+  <p:clrMapOvr>
+    <a:masterClrMapping/>
+  </p:clrMapOvr>
+</p:sld>
+</file>
+
+<file path=ppt/slides/slide9.xml><?xml version="1.0" encoding="utf-8"?>
+<p:sld xmlns:a="http://schemas.openxmlformats.org/drawingml/2006/main" xmlns:r="http://schemas.openxmlformats.org/officeDocument/2006/relationships" xmlns:p="http://schemas.openxmlformats.org/presentationml/2006/main">
+  <p:cSld>
+    <p:spTree>
+      <p:nvGrpSpPr>
+        <p:cNvPr id="1" name=""/>
+        <p:cNvGrpSpPr/>
+        <p:nvPr/>
+      </p:nvGrpSpPr>
+      <p:grpSpPr>
+        <a:xfrm>
+          <a:off x="0" y="0"/>
+          <a:ext cx="0" cy="0"/>
+          <a:chOff x="0" y="0"/>
+          <a:chExt cx="0" cy="0"/>
+        </a:xfrm>
+      </p:grpSpPr>
+      <p:sp>
+        <p:nvSpPr>
+          <p:cNvPr id="2" name="Заголовок 1">
+            <a:extLst>
+              <a:ext uri="{FF2B5EF4-FFF2-40B4-BE49-F238E27FC236}">
+                <a16:creationId xmlns:a16="http://schemas.microsoft.com/office/drawing/2014/main" id="{01D7379F-8D7F-46F1-A315-0DE0D11CB1DF}"/>
+              </a:ext>
+            </a:extLst>
+          </p:cNvPr>
+          <p:cNvSpPr>
+            <a:spLocks noGrp="1"/>
+          </p:cNvSpPr>
+          <p:nvPr>
+            <p:ph type="title"/>
+          </p:nvPr>
+        </p:nvSpPr>
+        <p:spPr/>
+        <p:txBody>
+          <a:bodyPr/>
+          <a:lstStyle/>
+          <a:p>
+            <a:r>
+              <a:rPr lang="ru-RU" dirty="0"/>
+              <a:t>Создание опросов</a:t>
+            </a:r>
+          </a:p>
+        </p:txBody>
+      </p:sp>
+      <p:pic>
+        <p:nvPicPr>
+          <p:cNvPr id="7" name="Объект 6">
+            <a:extLst>
+              <a:ext uri="{FF2B5EF4-FFF2-40B4-BE49-F238E27FC236}">
+                <a16:creationId xmlns:a16="http://schemas.microsoft.com/office/drawing/2014/main" id="{EC9C8ED9-C9D3-416C-8703-C9F72B844E33}"/>
+              </a:ext>
+            </a:extLst>
+          </p:cNvPr>
+          <p:cNvPicPr>
+            <a:picLocks noGrp="1" noChangeAspect="1"/>
+          </p:cNvPicPr>
+          <p:nvPr>
+            <p:ph idx="1"/>
+          </p:nvPr>
+        </p:nvPicPr>
+        <p:blipFill>
+          <a:blip r:embed="rId2"/>
+          <a:stretch>
+            <a:fillRect/>
+          </a:stretch>
+        </p:blipFill>
+        <p:spPr>
+          <a:xfrm>
+            <a:off x="2228144" y="1825625"/>
+            <a:ext cx="7735712" cy="4351338"/>
+          </a:xfrm>
+        </p:spPr>
+      </p:pic>
+    </p:spTree>
+    <p:extLst>
+      <p:ext uri="{BB962C8B-B14F-4D97-AF65-F5344CB8AC3E}">
+        <p14:creationId xmlns:p14="http://schemas.microsoft.com/office/powerpoint/2010/main" val="3488234269"/>
       </p:ext>
     </p:extLst>
   </p:cSld>

</xml_diff>